<commit_message>
added some more assets
</commit_message>
<xml_diff>
--- a/about the channel.pptx
+++ b/about the channel.pptx
@@ -5,12 +5,12 @@
     <p:sldMasterId id="2147483648" r:id="rId1"/>
   </p:sldMasterIdLst>
   <p:sldIdLst>
-    <p:sldId id="256" r:id="rId3"/>
-    <p:sldId id="257" r:id="rId4"/>
-    <p:sldId id="258" r:id="rId5"/>
-    <p:sldId id="260" r:id="rId6"/>
-    <p:sldId id="261" r:id="rId7"/>
-    <p:sldId id="259" r:id="rId8"/>
+    <p:sldId id="256" r:id="rId2"/>
+    <p:sldId id="257" r:id="rId3"/>
+    <p:sldId id="258" r:id="rId4"/>
+    <p:sldId id="260" r:id="rId5"/>
+    <p:sldId id="261" r:id="rId6"/>
+    <p:sldId id="259" r:id="rId7"/>
   </p:sldIdLst>
   <p:sldSz cx="12192000" cy="6858000"/>
   <p:notesSz cx="6858000" cy="9144000"/>
@@ -109,6 +109,11 @@
       </a:defRPr>
     </a:lvl9pPr>
   </p:defaultTextStyle>
+  <p:extLst>
+    <p:ext uri="{EFAFB233-063F-42B5-8137-9DF3F51BA10A}">
+      <p15:sldGuideLst xmlns:p15="http://schemas.microsoft.com/office/powerpoint/2012/main"/>
+    </p:ext>
+  </p:extLst>
 </p:presentation>
 </file>
 
@@ -154,10 +159,9 @@
           </a:lstStyle>
           <a:p>
             <a:r>
-              <a:rPr lang="en-US" smtClean="0"/>
+              <a:rPr lang="en-US"/>
               <a:t>Click to edit Master title style</a:t>
             </a:r>
-            <a:endParaRPr lang="en-US"/>
           </a:p>
         </p:txBody>
       </p:sp>
@@ -219,10 +223,9 @@
           </a:lstStyle>
           <a:p>
             <a:r>
-              <a:rPr lang="en-US" smtClean="0"/>
+              <a:rPr lang="en-US"/>
               <a:t>Click to edit Master subtitle style</a:t>
             </a:r>
-            <a:endParaRPr lang="en-US"/>
           </a:p>
         </p:txBody>
       </p:sp>
@@ -243,6 +246,7 @@
           <a:p>
             <a:fld id="{63A1C593-65D0-4073-BCC9-577B9352EA97}" type="datetimeFigureOut">
               <a:rPr lang="en-US" smtClean="0"/>
+              <a:t>2/12/2024</a:t>
             </a:fld>
             <a:endParaRPr lang="en-US"/>
           </a:p>
@@ -284,6 +288,7 @@
           <a:p>
             <a:fld id="{9B618960-8005-486C-9A75-10CB2AAC16F9}" type="slidenum">
               <a:rPr lang="en-US" smtClean="0"/>
+              <a:t>‹#›</a:t>
             </a:fld>
             <a:endParaRPr lang="en-US"/>
           </a:p>
@@ -331,10 +336,9 @@
           <a:lstStyle/>
           <a:p>
             <a:r>
-              <a:rPr lang="en-US" smtClean="0"/>
+              <a:rPr lang="en-US"/>
               <a:t>Click to edit Master title style</a:t>
             </a:r>
-            <a:endParaRPr lang="en-US"/>
           </a:p>
         </p:txBody>
       </p:sp>
@@ -355,42 +359,37 @@
           <a:p>
             <a:pPr lvl="0"/>
             <a:r>
-              <a:rPr lang="en-US" smtClean="0"/>
+              <a:rPr lang="en-US"/>
               <a:t>Click to edit Master text styles</a:t>
             </a:r>
-            <a:endParaRPr lang="en-US" smtClean="0"/>
           </a:p>
           <a:p>
             <a:pPr lvl="1"/>
             <a:r>
-              <a:rPr lang="en-US" smtClean="0"/>
+              <a:rPr lang="en-US"/>
               <a:t>Second level</a:t>
             </a:r>
-            <a:endParaRPr lang="en-US" smtClean="0"/>
           </a:p>
           <a:p>
             <a:pPr lvl="2"/>
             <a:r>
-              <a:rPr lang="en-US" smtClean="0"/>
+              <a:rPr lang="en-US"/>
               <a:t>Third level</a:t>
             </a:r>
-            <a:endParaRPr lang="en-US" smtClean="0"/>
           </a:p>
           <a:p>
             <a:pPr lvl="3"/>
             <a:r>
-              <a:rPr lang="en-US" smtClean="0"/>
+              <a:rPr lang="en-US"/>
               <a:t>Fourth level</a:t>
             </a:r>
-            <a:endParaRPr lang="en-US" smtClean="0"/>
           </a:p>
           <a:p>
             <a:pPr lvl="4"/>
             <a:r>
-              <a:rPr lang="en-US" smtClean="0"/>
+              <a:rPr lang="en-US"/>
               <a:t>Fifth level</a:t>
             </a:r>
-            <a:endParaRPr lang="en-US"/>
           </a:p>
         </p:txBody>
       </p:sp>
@@ -411,6 +410,7 @@
           <a:p>
             <a:fld id="{63A1C593-65D0-4073-BCC9-577B9352EA97}" type="datetimeFigureOut">
               <a:rPr lang="en-US" smtClean="0"/>
+              <a:t>2/12/2024</a:t>
             </a:fld>
             <a:endParaRPr lang="en-US"/>
           </a:p>
@@ -452,6 +452,7 @@
           <a:p>
             <a:fld id="{9B618960-8005-486C-9A75-10CB2AAC16F9}" type="slidenum">
               <a:rPr lang="en-US" smtClean="0"/>
+              <a:t>‹#›</a:t>
             </a:fld>
             <a:endParaRPr lang="en-US"/>
           </a:p>
@@ -504,10 +505,9 @@
           <a:lstStyle/>
           <a:p>
             <a:r>
-              <a:rPr lang="en-US" smtClean="0"/>
+              <a:rPr lang="en-US"/>
               <a:t>Click to edit Master title style</a:t>
             </a:r>
-            <a:endParaRPr lang="en-US"/>
           </a:p>
         </p:txBody>
       </p:sp>
@@ -533,42 +533,37 @@
           <a:p>
             <a:pPr lvl="0"/>
             <a:r>
-              <a:rPr lang="en-US" smtClean="0"/>
+              <a:rPr lang="en-US"/>
               <a:t>Click to edit Master text styles</a:t>
             </a:r>
-            <a:endParaRPr lang="en-US" smtClean="0"/>
           </a:p>
           <a:p>
             <a:pPr lvl="1"/>
             <a:r>
-              <a:rPr lang="en-US" smtClean="0"/>
+              <a:rPr lang="en-US"/>
               <a:t>Second level</a:t>
             </a:r>
-            <a:endParaRPr lang="en-US" smtClean="0"/>
           </a:p>
           <a:p>
             <a:pPr lvl="2"/>
             <a:r>
-              <a:rPr lang="en-US" smtClean="0"/>
+              <a:rPr lang="en-US"/>
               <a:t>Third level</a:t>
             </a:r>
-            <a:endParaRPr lang="en-US" smtClean="0"/>
           </a:p>
           <a:p>
             <a:pPr lvl="3"/>
             <a:r>
-              <a:rPr lang="en-US" smtClean="0"/>
+              <a:rPr lang="en-US"/>
               <a:t>Fourth level</a:t>
             </a:r>
-            <a:endParaRPr lang="en-US" smtClean="0"/>
           </a:p>
           <a:p>
             <a:pPr lvl="4"/>
             <a:r>
-              <a:rPr lang="en-US" smtClean="0"/>
+              <a:rPr lang="en-US"/>
               <a:t>Fifth level</a:t>
             </a:r>
-            <a:endParaRPr lang="en-US"/>
           </a:p>
         </p:txBody>
       </p:sp>
@@ -589,6 +584,7 @@
           <a:p>
             <a:fld id="{63A1C593-65D0-4073-BCC9-577B9352EA97}" type="datetimeFigureOut">
               <a:rPr lang="en-US" smtClean="0"/>
+              <a:t>2/12/2024</a:t>
             </a:fld>
             <a:endParaRPr lang="en-US"/>
           </a:p>
@@ -630,6 +626,7 @@
           <a:p>
             <a:fld id="{9B618960-8005-486C-9A75-10CB2AAC16F9}" type="slidenum">
               <a:rPr lang="en-US" smtClean="0"/>
+              <a:t>‹#›</a:t>
             </a:fld>
             <a:endParaRPr lang="en-US"/>
           </a:p>
@@ -677,10 +674,9 @@
           <a:lstStyle/>
           <a:p>
             <a:r>
-              <a:rPr lang="en-US" smtClean="0"/>
+              <a:rPr lang="en-US"/>
               <a:t>Click to edit Master title style</a:t>
             </a:r>
-            <a:endParaRPr lang="en-US"/>
           </a:p>
         </p:txBody>
       </p:sp>
@@ -701,42 +697,37 @@
           <a:p>
             <a:pPr lvl="0"/>
             <a:r>
-              <a:rPr lang="en-US" smtClean="0"/>
+              <a:rPr lang="en-US"/>
               <a:t>Click to edit Master text styles</a:t>
             </a:r>
-            <a:endParaRPr lang="en-US" smtClean="0"/>
           </a:p>
           <a:p>
             <a:pPr lvl="1"/>
             <a:r>
-              <a:rPr lang="en-US" smtClean="0"/>
+              <a:rPr lang="en-US"/>
               <a:t>Second level</a:t>
             </a:r>
-            <a:endParaRPr lang="en-US" smtClean="0"/>
           </a:p>
           <a:p>
             <a:pPr lvl="2"/>
             <a:r>
-              <a:rPr lang="en-US" smtClean="0"/>
+              <a:rPr lang="en-US"/>
               <a:t>Third level</a:t>
             </a:r>
-            <a:endParaRPr lang="en-US" smtClean="0"/>
           </a:p>
           <a:p>
             <a:pPr lvl="3"/>
             <a:r>
-              <a:rPr lang="en-US" smtClean="0"/>
+              <a:rPr lang="en-US"/>
               <a:t>Fourth level</a:t>
             </a:r>
-            <a:endParaRPr lang="en-US" smtClean="0"/>
           </a:p>
           <a:p>
             <a:pPr lvl="4"/>
             <a:r>
-              <a:rPr lang="en-US" smtClean="0"/>
+              <a:rPr lang="en-US"/>
               <a:t>Fifth level</a:t>
             </a:r>
-            <a:endParaRPr lang="en-US"/>
           </a:p>
         </p:txBody>
       </p:sp>
@@ -757,6 +748,7 @@
           <a:p>
             <a:fld id="{63A1C593-65D0-4073-BCC9-577B9352EA97}" type="datetimeFigureOut">
               <a:rPr lang="en-US" smtClean="0"/>
+              <a:t>2/12/2024</a:t>
             </a:fld>
             <a:endParaRPr lang="en-US"/>
           </a:p>
@@ -798,6 +790,7 @@
           <a:p>
             <a:fld id="{9B618960-8005-486C-9A75-10CB2AAC16F9}" type="slidenum">
               <a:rPr lang="en-US" smtClean="0"/>
+              <a:t>‹#›</a:t>
             </a:fld>
             <a:endParaRPr lang="en-US"/>
           </a:p>
@@ -854,10 +847,9 @@
           </a:lstStyle>
           <a:p>
             <a:r>
-              <a:rPr lang="en-US" smtClean="0"/>
+              <a:rPr lang="en-US"/>
               <a:t>Click to edit Master title style</a:t>
             </a:r>
-            <a:endParaRPr lang="en-US"/>
           </a:p>
         </p:txBody>
       </p:sp>
@@ -974,10 +966,9 @@
           <a:p>
             <a:pPr lvl="0"/>
             <a:r>
-              <a:rPr lang="en-US" smtClean="0"/>
+              <a:rPr lang="en-US"/>
               <a:t>Click to edit Master text styles</a:t>
             </a:r>
-            <a:endParaRPr lang="en-US" smtClean="0"/>
           </a:p>
         </p:txBody>
       </p:sp>
@@ -998,6 +989,7 @@
           <a:p>
             <a:fld id="{63A1C593-65D0-4073-BCC9-577B9352EA97}" type="datetimeFigureOut">
               <a:rPr lang="en-US" smtClean="0"/>
+              <a:t>2/12/2024</a:t>
             </a:fld>
             <a:endParaRPr lang="en-US"/>
           </a:p>
@@ -1039,6 +1031,7 @@
           <a:p>
             <a:fld id="{9B618960-8005-486C-9A75-10CB2AAC16F9}" type="slidenum">
               <a:rPr lang="en-US" smtClean="0"/>
+              <a:t>‹#›</a:t>
             </a:fld>
             <a:endParaRPr lang="en-US"/>
           </a:p>
@@ -1086,10 +1079,9 @@
           <a:lstStyle/>
           <a:p>
             <a:r>
-              <a:rPr lang="en-US" smtClean="0"/>
+              <a:rPr lang="en-US"/>
               <a:t>Click to edit Master title style</a:t>
             </a:r>
-            <a:endParaRPr lang="en-US"/>
           </a:p>
         </p:txBody>
       </p:sp>
@@ -1115,42 +1107,37 @@
           <a:p>
             <a:pPr lvl="0"/>
             <a:r>
-              <a:rPr lang="en-US" smtClean="0"/>
+              <a:rPr lang="en-US"/>
               <a:t>Click to edit Master text styles</a:t>
             </a:r>
-            <a:endParaRPr lang="en-US" smtClean="0"/>
           </a:p>
           <a:p>
             <a:pPr lvl="1"/>
             <a:r>
-              <a:rPr lang="en-US" smtClean="0"/>
+              <a:rPr lang="en-US"/>
               <a:t>Second level</a:t>
             </a:r>
-            <a:endParaRPr lang="en-US" smtClean="0"/>
           </a:p>
           <a:p>
             <a:pPr lvl="2"/>
             <a:r>
-              <a:rPr lang="en-US" smtClean="0"/>
+              <a:rPr lang="en-US"/>
               <a:t>Third level</a:t>
             </a:r>
-            <a:endParaRPr lang="en-US" smtClean="0"/>
           </a:p>
           <a:p>
             <a:pPr lvl="3"/>
             <a:r>
-              <a:rPr lang="en-US" smtClean="0"/>
+              <a:rPr lang="en-US"/>
               <a:t>Fourth level</a:t>
             </a:r>
-            <a:endParaRPr lang="en-US" smtClean="0"/>
           </a:p>
           <a:p>
             <a:pPr lvl="4"/>
             <a:r>
-              <a:rPr lang="en-US" smtClean="0"/>
+              <a:rPr lang="en-US"/>
               <a:t>Fifth level</a:t>
             </a:r>
-            <a:endParaRPr lang="en-US"/>
           </a:p>
         </p:txBody>
       </p:sp>
@@ -1176,42 +1163,37 @@
           <a:p>
             <a:pPr lvl="0"/>
             <a:r>
-              <a:rPr lang="en-US" smtClean="0"/>
+              <a:rPr lang="en-US"/>
               <a:t>Click to edit Master text styles</a:t>
             </a:r>
-            <a:endParaRPr lang="en-US" smtClean="0"/>
           </a:p>
           <a:p>
             <a:pPr lvl="1"/>
             <a:r>
-              <a:rPr lang="en-US" smtClean="0"/>
+              <a:rPr lang="en-US"/>
               <a:t>Second level</a:t>
             </a:r>
-            <a:endParaRPr lang="en-US" smtClean="0"/>
           </a:p>
           <a:p>
             <a:pPr lvl="2"/>
             <a:r>
-              <a:rPr lang="en-US" smtClean="0"/>
+              <a:rPr lang="en-US"/>
               <a:t>Third level</a:t>
             </a:r>
-            <a:endParaRPr lang="en-US" smtClean="0"/>
           </a:p>
           <a:p>
             <a:pPr lvl="3"/>
             <a:r>
-              <a:rPr lang="en-US" smtClean="0"/>
+              <a:rPr lang="en-US"/>
               <a:t>Fourth level</a:t>
             </a:r>
-            <a:endParaRPr lang="en-US" smtClean="0"/>
           </a:p>
           <a:p>
             <a:pPr lvl="4"/>
             <a:r>
-              <a:rPr lang="en-US" smtClean="0"/>
+              <a:rPr lang="en-US"/>
               <a:t>Fifth level</a:t>
             </a:r>
-            <a:endParaRPr lang="en-US"/>
           </a:p>
         </p:txBody>
       </p:sp>
@@ -1232,6 +1214,7 @@
           <a:p>
             <a:fld id="{63A1C593-65D0-4073-BCC9-577B9352EA97}" type="datetimeFigureOut">
               <a:rPr lang="en-US" smtClean="0"/>
+              <a:t>2/12/2024</a:t>
             </a:fld>
             <a:endParaRPr lang="en-US"/>
           </a:p>
@@ -1273,6 +1256,7 @@
           <a:p>
             <a:fld id="{9B618960-8005-486C-9A75-10CB2AAC16F9}" type="slidenum">
               <a:rPr lang="en-US" smtClean="0"/>
+              <a:t>‹#›</a:t>
             </a:fld>
             <a:endParaRPr lang="en-US"/>
           </a:p>
@@ -1325,10 +1309,9 @@
           <a:lstStyle/>
           <a:p>
             <a:r>
-              <a:rPr lang="en-US" smtClean="0"/>
+              <a:rPr lang="en-US"/>
               <a:t>Click to edit Master title style</a:t>
             </a:r>
-            <a:endParaRPr lang="en-US"/>
           </a:p>
         </p:txBody>
       </p:sp>
@@ -1391,10 +1374,9 @@
           <a:p>
             <a:pPr lvl="0"/>
             <a:r>
-              <a:rPr lang="en-US" smtClean="0"/>
+              <a:rPr lang="en-US"/>
               <a:t>Click to edit Master text styles</a:t>
             </a:r>
-            <a:endParaRPr lang="en-US" smtClean="0"/>
           </a:p>
         </p:txBody>
       </p:sp>
@@ -1420,42 +1402,37 @@
           <a:p>
             <a:pPr lvl="0"/>
             <a:r>
-              <a:rPr lang="en-US" smtClean="0"/>
+              <a:rPr lang="en-US"/>
               <a:t>Click to edit Master text styles</a:t>
             </a:r>
-            <a:endParaRPr lang="en-US" smtClean="0"/>
           </a:p>
           <a:p>
             <a:pPr lvl="1"/>
             <a:r>
-              <a:rPr lang="en-US" smtClean="0"/>
+              <a:rPr lang="en-US"/>
               <a:t>Second level</a:t>
             </a:r>
-            <a:endParaRPr lang="en-US" smtClean="0"/>
           </a:p>
           <a:p>
             <a:pPr lvl="2"/>
             <a:r>
-              <a:rPr lang="en-US" smtClean="0"/>
+              <a:rPr lang="en-US"/>
               <a:t>Third level</a:t>
             </a:r>
-            <a:endParaRPr lang="en-US" smtClean="0"/>
           </a:p>
           <a:p>
             <a:pPr lvl="3"/>
             <a:r>
-              <a:rPr lang="en-US" smtClean="0"/>
+              <a:rPr lang="en-US"/>
               <a:t>Fourth level</a:t>
             </a:r>
-            <a:endParaRPr lang="en-US" smtClean="0"/>
           </a:p>
           <a:p>
             <a:pPr lvl="4"/>
             <a:r>
-              <a:rPr lang="en-US" smtClean="0"/>
+              <a:rPr lang="en-US"/>
               <a:t>Fifth level</a:t>
             </a:r>
-            <a:endParaRPr lang="en-US"/>
           </a:p>
         </p:txBody>
       </p:sp>
@@ -1518,10 +1495,9 @@
           <a:p>
             <a:pPr lvl="0"/>
             <a:r>
-              <a:rPr lang="en-US" smtClean="0"/>
+              <a:rPr lang="en-US"/>
               <a:t>Click to edit Master text styles</a:t>
             </a:r>
-            <a:endParaRPr lang="en-US" smtClean="0"/>
           </a:p>
         </p:txBody>
       </p:sp>
@@ -1547,42 +1523,37 @@
           <a:p>
             <a:pPr lvl="0"/>
             <a:r>
-              <a:rPr lang="en-US" smtClean="0"/>
+              <a:rPr lang="en-US"/>
               <a:t>Click to edit Master text styles</a:t>
             </a:r>
-            <a:endParaRPr lang="en-US" smtClean="0"/>
           </a:p>
           <a:p>
             <a:pPr lvl="1"/>
             <a:r>
-              <a:rPr lang="en-US" smtClean="0"/>
+              <a:rPr lang="en-US"/>
               <a:t>Second level</a:t>
             </a:r>
-            <a:endParaRPr lang="en-US" smtClean="0"/>
           </a:p>
           <a:p>
             <a:pPr lvl="2"/>
             <a:r>
-              <a:rPr lang="en-US" smtClean="0"/>
+              <a:rPr lang="en-US"/>
               <a:t>Third level</a:t>
             </a:r>
-            <a:endParaRPr lang="en-US" smtClean="0"/>
           </a:p>
           <a:p>
             <a:pPr lvl="3"/>
             <a:r>
-              <a:rPr lang="en-US" smtClean="0"/>
+              <a:rPr lang="en-US"/>
               <a:t>Fourth level</a:t>
             </a:r>
-            <a:endParaRPr lang="en-US" smtClean="0"/>
           </a:p>
           <a:p>
             <a:pPr lvl="4"/>
             <a:r>
-              <a:rPr lang="en-US" smtClean="0"/>
+              <a:rPr lang="en-US"/>
               <a:t>Fifth level</a:t>
             </a:r>
-            <a:endParaRPr lang="en-US"/>
           </a:p>
         </p:txBody>
       </p:sp>
@@ -1603,6 +1574,7 @@
           <a:p>
             <a:fld id="{63A1C593-65D0-4073-BCC9-577B9352EA97}" type="datetimeFigureOut">
               <a:rPr lang="en-US" smtClean="0"/>
+              <a:t>2/12/2024</a:t>
             </a:fld>
             <a:endParaRPr lang="en-US"/>
           </a:p>
@@ -1644,6 +1616,7 @@
           <a:p>
             <a:fld id="{9B618960-8005-486C-9A75-10CB2AAC16F9}" type="slidenum">
               <a:rPr lang="en-US" smtClean="0"/>
+              <a:t>‹#›</a:t>
             </a:fld>
             <a:endParaRPr lang="en-US"/>
           </a:p>
@@ -1691,10 +1664,9 @@
           <a:lstStyle/>
           <a:p>
             <a:r>
-              <a:rPr lang="en-US" smtClean="0"/>
+              <a:rPr lang="en-US"/>
               <a:t>Click to edit Master title style</a:t>
             </a:r>
-            <a:endParaRPr lang="en-US"/>
           </a:p>
         </p:txBody>
       </p:sp>
@@ -1715,6 +1687,7 @@
           <a:p>
             <a:fld id="{63A1C593-65D0-4073-BCC9-577B9352EA97}" type="datetimeFigureOut">
               <a:rPr lang="en-US" smtClean="0"/>
+              <a:t>2/12/2024</a:t>
             </a:fld>
             <a:endParaRPr lang="en-US"/>
           </a:p>
@@ -1756,6 +1729,7 @@
           <a:p>
             <a:fld id="{9B618960-8005-486C-9A75-10CB2AAC16F9}" type="slidenum">
               <a:rPr lang="en-US" smtClean="0"/>
+              <a:t>‹#›</a:t>
             </a:fld>
             <a:endParaRPr lang="en-US"/>
           </a:p>
@@ -1804,6 +1778,7 @@
           <a:p>
             <a:fld id="{63A1C593-65D0-4073-BCC9-577B9352EA97}" type="datetimeFigureOut">
               <a:rPr lang="en-US" smtClean="0"/>
+              <a:t>2/12/2024</a:t>
             </a:fld>
             <a:endParaRPr lang="en-US"/>
           </a:p>
@@ -1845,6 +1820,7 @@
           <a:p>
             <a:fld id="{9B618960-8005-486C-9A75-10CB2AAC16F9}" type="slidenum">
               <a:rPr lang="en-US" smtClean="0"/>
+              <a:t>‹#›</a:t>
             </a:fld>
             <a:endParaRPr lang="en-US"/>
           </a:p>
@@ -1901,10 +1877,9 @@
           </a:lstStyle>
           <a:p>
             <a:r>
-              <a:rPr lang="en-US" smtClean="0"/>
+              <a:rPr lang="en-US"/>
               <a:t>Click to edit Master title style</a:t>
             </a:r>
-            <a:endParaRPr lang="en-US"/>
           </a:p>
         </p:txBody>
       </p:sp>
@@ -1958,42 +1933,37 @@
           <a:p>
             <a:pPr lvl="0"/>
             <a:r>
-              <a:rPr lang="en-US" smtClean="0"/>
+              <a:rPr lang="en-US"/>
               <a:t>Click to edit Master text styles</a:t>
             </a:r>
-            <a:endParaRPr lang="en-US" smtClean="0"/>
           </a:p>
           <a:p>
             <a:pPr lvl="1"/>
             <a:r>
-              <a:rPr lang="en-US" smtClean="0"/>
+              <a:rPr lang="en-US"/>
               <a:t>Second level</a:t>
             </a:r>
-            <a:endParaRPr lang="en-US" smtClean="0"/>
           </a:p>
           <a:p>
             <a:pPr lvl="2"/>
             <a:r>
-              <a:rPr lang="en-US" smtClean="0"/>
+              <a:rPr lang="en-US"/>
               <a:t>Third level</a:t>
             </a:r>
-            <a:endParaRPr lang="en-US" smtClean="0"/>
           </a:p>
           <a:p>
             <a:pPr lvl="3"/>
             <a:r>
-              <a:rPr lang="en-US" smtClean="0"/>
+              <a:rPr lang="en-US"/>
               <a:t>Fourth level</a:t>
             </a:r>
-            <a:endParaRPr lang="en-US" smtClean="0"/>
           </a:p>
           <a:p>
             <a:pPr lvl="4"/>
             <a:r>
-              <a:rPr lang="en-US" smtClean="0"/>
+              <a:rPr lang="en-US"/>
               <a:t>Fifth level</a:t>
             </a:r>
-            <a:endParaRPr lang="en-US"/>
           </a:p>
         </p:txBody>
       </p:sp>
@@ -2056,10 +2026,9 @@
           <a:p>
             <a:pPr lvl="0"/>
             <a:r>
-              <a:rPr lang="en-US" smtClean="0"/>
+              <a:rPr lang="en-US"/>
               <a:t>Click to edit Master text styles</a:t>
             </a:r>
-            <a:endParaRPr lang="en-US" smtClean="0"/>
           </a:p>
         </p:txBody>
       </p:sp>
@@ -2080,6 +2049,7 @@
           <a:p>
             <a:fld id="{63A1C593-65D0-4073-BCC9-577B9352EA97}" type="datetimeFigureOut">
               <a:rPr lang="en-US" smtClean="0"/>
+              <a:t>2/12/2024</a:t>
             </a:fld>
             <a:endParaRPr lang="en-US"/>
           </a:p>
@@ -2121,6 +2091,7 @@
           <a:p>
             <a:fld id="{9B618960-8005-486C-9A75-10CB2AAC16F9}" type="slidenum">
               <a:rPr lang="en-US" smtClean="0"/>
+              <a:t>‹#›</a:t>
             </a:fld>
             <a:endParaRPr lang="en-US"/>
           </a:p>
@@ -2177,10 +2148,9 @@
           </a:lstStyle>
           <a:p>
             <a:r>
-              <a:rPr lang="en-US" smtClean="0"/>
+              <a:rPr lang="en-US"/>
               <a:t>Click to edit Master title style</a:t>
             </a:r>
-            <a:endParaRPr lang="en-US"/>
           </a:p>
         </p:txBody>
       </p:sp>
@@ -2304,10 +2274,9 @@
           <a:p>
             <a:pPr lvl="0"/>
             <a:r>
-              <a:rPr lang="en-US" smtClean="0"/>
+              <a:rPr lang="en-US"/>
               <a:t>Click to edit Master text styles</a:t>
             </a:r>
-            <a:endParaRPr lang="en-US" smtClean="0"/>
           </a:p>
         </p:txBody>
       </p:sp>
@@ -2328,6 +2297,7 @@
           <a:p>
             <a:fld id="{63A1C593-65D0-4073-BCC9-577B9352EA97}" type="datetimeFigureOut">
               <a:rPr lang="en-US" smtClean="0"/>
+              <a:t>2/12/2024</a:t>
             </a:fld>
             <a:endParaRPr lang="en-US"/>
           </a:p>
@@ -2369,6 +2339,7 @@
           <a:p>
             <a:fld id="{9B618960-8005-486C-9A75-10CB2AAC16F9}" type="slidenum">
               <a:rPr lang="en-US" smtClean="0"/>
+              <a:t>‹#›</a:t>
             </a:fld>
             <a:endParaRPr lang="en-US"/>
           </a:p>
@@ -2379,13 +2350,6 @@
   <p:clrMapOvr>
     <a:masterClrMapping/>
   </p:clrMapOvr>
-  <p:timing>
-    <p:tnLst>
-      <p:par>
-        <p:cTn id="1" dur="indefinite" restart="never" nodeType="tmRoot"/>
-      </p:par>
-    </p:tnLst>
-  </p:timing>
   <p:hf sldNum="0" hdr="0" ftr="0" dt="0"/>
 </p:sldLayout>
 </file>
@@ -2409,11 +2373,20 @@
         <p:cNvGrpSpPr/>
         <p:nvPr/>
       </p:nvGrpSpPr>
-      <p:grpSpPr/>
+      <p:grpSpPr>
+        <a:xfrm>
+          <a:off x="0" y="0"/>
+          <a:ext cx="0" cy="0"/>
+          <a:chOff x="0" y="0"/>
+          <a:chExt cx="0" cy="0"/>
+        </a:xfrm>
+      </p:grpSpPr>
       <p:sp>
         <p:nvSpPr>
           <p:cNvPr id="1026" name="Title 1025"/>
-          <p:cNvSpPr/>
+          <p:cNvSpPr>
+            <a:spLocks noGrp="1"/>
+          </p:cNvSpPr>
           <p:nvPr>
             <p:ph type="title"/>
           </p:nvPr>
@@ -2433,6 +2406,7 @@
         </p:spPr>
         <p:txBody>
           <a:bodyPr anchor="ctr" anchorCtr="0"/>
+          <a:lstStyle/>
           <a:p>
             <a:pPr lvl="0"/>
             <a:r>
@@ -2444,7 +2418,9 @@
       <p:sp>
         <p:nvSpPr>
           <p:cNvPr id="1027" name="Text Placeholder 1026"/>
-          <p:cNvSpPr/>
+          <p:cNvSpPr>
+            <a:spLocks noGrp="1"/>
+          </p:cNvSpPr>
           <p:nvPr>
             <p:ph type="body" idx="1"/>
           </p:nvPr>
@@ -2464,6 +2440,7 @@
         </p:spPr>
         <p:txBody>
           <a:bodyPr/>
+          <a:lstStyle/>
           <a:p>
             <a:pPr lvl="0"/>
             <a:r>
@@ -2499,7 +2476,9 @@
       <p:sp>
         <p:nvSpPr>
           <p:cNvPr id="1028" name="Date Placeholder 1027"/>
-          <p:cNvSpPr/>
+          <p:cNvSpPr>
+            <a:spLocks noGrp="1"/>
+          </p:cNvSpPr>
           <p:nvPr>
             <p:ph type="dt" sz="half" idx="2"/>
           </p:nvPr>
@@ -2527,6 +2506,7 @@
           <a:p>
             <a:fld id="{63A1C593-65D0-4073-BCC9-577B9352EA97}" type="datetimeFigureOut">
               <a:rPr lang="en-US" smtClean="0"/>
+              <a:t>2/12/2024</a:t>
             </a:fld>
             <a:endParaRPr lang="en-US"/>
           </a:p>
@@ -2535,7 +2515,9 @@
       <p:sp>
         <p:nvSpPr>
           <p:cNvPr id="1029" name="Footer Placeholder 1028"/>
-          <p:cNvSpPr/>
+          <p:cNvSpPr>
+            <a:spLocks noGrp="1"/>
+          </p:cNvSpPr>
           <p:nvPr>
             <p:ph type="ftr" sz="quarter" idx="3"/>
           </p:nvPr>
@@ -2568,7 +2550,9 @@
       <p:sp>
         <p:nvSpPr>
           <p:cNvPr id="1030" name="Slide Number Placeholder 1029"/>
-          <p:cNvSpPr/>
+          <p:cNvSpPr>
+            <a:spLocks noGrp="1"/>
+          </p:cNvSpPr>
           <p:nvPr>
             <p:ph type="sldNum" sz="quarter" idx="4"/>
           </p:nvPr>
@@ -2596,6 +2580,7 @@
           <a:p>
             <a:fld id="{9B618960-8005-486C-9A75-10CB2AAC16F9}" type="slidenum">
               <a:rPr lang="en-US" smtClean="0"/>
+              <a:t>‹#›</a:t>
             </a:fld>
             <a:endParaRPr lang="en-US"/>
           </a:p>
@@ -3068,6 +3053,7 @@
           <a:bodyPr wrap="square" rtlCol="0" anchor="t">
             <a:spAutoFit/>
           </a:bodyPr>
+          <a:lstStyle/>
           <a:p>
             <a:pPr algn="ctr"/>
             <a:r>
@@ -3093,26 +3079,6 @@
               </a:rPr>
               <a:t>Neutrals Learning Center</a:t>
             </a:r>
-            <a:endParaRPr lang="en-US" altLang="zh-CN" sz="2400" b="1">
-              <a:gradFill>
-                <a:gsLst>
-                  <a:gs pos="0">
-                    <a:srgbClr val="FBFB11"/>
-                  </a:gs>
-                  <a:gs pos="100000">
-                    <a:srgbClr val="838309"/>
-                  </a:gs>
-                </a:gsLst>
-                <a:lin scaled="0"/>
-              </a:gradFill>
-              <a:effectLst>
-                <a:outerShdw blurRad="38100" dist="25400" dir="5400000" algn="ctr" rotWithShape="0">
-                  <a:srgbClr val="6E747A">
-                    <a:alpha val="43000"/>
-                  </a:srgbClr>
-                </a:outerShdw>
-              </a:effectLst>
-            </a:endParaRPr>
           </a:p>
         </p:txBody>
       </p:sp>
@@ -3139,7 +3105,7 @@
             <p:nvPr/>
           </p:nvPicPr>
           <p:blipFill>
-            <a:blip r:embed="rId1"/>
+            <a:blip r:embed="rId2"/>
             <a:stretch>
               <a:fillRect/>
             </a:stretch>
@@ -3163,7 +3129,7 @@
             <p:nvPr/>
           </p:nvPicPr>
           <p:blipFill>
-            <a:blip r:embed="rId2"/>
+            <a:blip r:embed="rId3"/>
             <a:stretch>
               <a:fillRect/>
             </a:stretch>
@@ -3196,7 +3162,14 @@
         <p:cNvGrpSpPr/>
         <p:nvPr/>
       </p:nvGrpSpPr>
-      <p:grpSpPr/>
+      <p:grpSpPr>
+        <a:xfrm>
+          <a:off x="0" y="0"/>
+          <a:ext cx="0" cy="0"/>
+          <a:chOff x="0" y="0"/>
+          <a:chExt cx="0" cy="0"/>
+        </a:xfrm>
+      </p:grpSpPr>
       <p:sp>
         <p:nvSpPr>
           <p:cNvPr id="2" name="Title 1"/>
@@ -3215,12 +3188,12 @@
         </p:spPr>
         <p:txBody>
           <a:bodyPr/>
+          <a:lstStyle/>
           <a:p>
             <a:r>
               <a:rPr lang="en-US"/>
               <a:t>What I want to do with this channel?</a:t>
             </a:r>
-            <a:endParaRPr lang="en-US"/>
           </a:p>
         </p:txBody>
       </p:sp>
@@ -3242,50 +3215,142 @@
         </p:spPr>
         <p:txBody>
           <a:bodyPr/>
-          <a:p>
-            <a:r>
-              <a:rPr lang="en-US"/>
+          <a:lstStyle/>
+          <a:p>
+            <a:pPr marL="18900" indent="0">
+              <a:spcBef>
+                <a:spcPts val="1200"/>
+              </a:spcBef>
+              <a:spcAft>
+                <a:spcPts val="600"/>
+              </a:spcAft>
+              <a:buClr>
+                <a:srgbClr val="FFC000"/>
+              </a:buClr>
+              <a:buNone/>
+              <a:tabLst>
+                <a:tab pos="36000" algn="l"/>
+              </a:tabLst>
+            </a:pPr>
+            <a:r>
+              <a:rPr lang="en-US" dirty="0"/>
               <a:t>Java </a:t>
             </a:r>
             <a:r>
-              <a:rPr lang="en-US">
+              <a:rPr lang="en-US" dirty="0">
                 <a:sym typeface="+mn-ea"/>
               </a:rPr>
               <a:t>Angular Fullstack</a:t>
             </a:r>
             <a:r>
-              <a:rPr lang="en-US"/>
+              <a:rPr lang="en-US" dirty="0"/>
               <a:t> Developer.</a:t>
             </a:r>
-            <a:endParaRPr lang="en-US"/>
-          </a:p>
-          <a:p>
-            <a:r>
-              <a:rPr lang="en-US"/>
+          </a:p>
+          <a:p>
+            <a:pPr marL="18900" indent="0">
+              <a:spcBef>
+                <a:spcPts val="1200"/>
+              </a:spcBef>
+              <a:spcAft>
+                <a:spcPts val="600"/>
+              </a:spcAft>
+              <a:buClr>
+                <a:srgbClr val="FFC000"/>
+              </a:buClr>
+              <a:buNone/>
+              <a:tabLst>
+                <a:tab pos="36000" algn="l"/>
+              </a:tabLst>
+            </a:pPr>
+            <a:r>
+              <a:rPr lang="en-US" dirty="0"/>
               <a:t>Beginner Friendly content.</a:t>
             </a:r>
-            <a:endParaRPr lang="en-US"/>
-          </a:p>
-          <a:p>
-            <a:r>
-              <a:rPr lang="en-US"/>
+          </a:p>
+          <a:p>
+            <a:pPr marL="18900" indent="0">
+              <a:spcBef>
+                <a:spcPts val="1200"/>
+              </a:spcBef>
+              <a:spcAft>
+                <a:spcPts val="600"/>
+              </a:spcAft>
+              <a:buClr>
+                <a:srgbClr val="FFC000"/>
+              </a:buClr>
+              <a:buNone/>
+              <a:tabLst>
+                <a:tab pos="36000" algn="l"/>
+              </a:tabLst>
+            </a:pPr>
+            <a:r>
+              <a:rPr lang="en-US" dirty="0"/>
               <a:t>Learning Path</a:t>
             </a:r>
-            <a:endParaRPr lang="en-US"/>
-          </a:p>
-          <a:p>
-            <a:r>
-              <a:rPr lang="en-US"/>
-              <a:t>All Tutorials acompanied with Reference Materials</a:t>
-            </a:r>
-            <a:endParaRPr lang="en-US"/>
-          </a:p>
-          <a:p>
-            <a:r>
-              <a:rPr lang="en-US"/>
-              <a:t>Tutorials have assesments in Googleclassroom</a:t>
-            </a:r>
-            <a:endParaRPr lang="en-US"/>
+          </a:p>
+          <a:p>
+            <a:pPr marL="18900" indent="0">
+              <a:spcBef>
+                <a:spcPts val="1200"/>
+              </a:spcBef>
+              <a:spcAft>
+                <a:spcPts val="600"/>
+              </a:spcAft>
+              <a:buClr>
+                <a:srgbClr val="FFC000"/>
+              </a:buClr>
+              <a:buNone/>
+              <a:tabLst>
+                <a:tab pos="36000" algn="l"/>
+              </a:tabLst>
+            </a:pPr>
+            <a:r>
+              <a:rPr lang="en-US" dirty="0"/>
+              <a:t>All Tutorials </a:t>
+            </a:r>
+            <a:r>
+              <a:rPr lang="en-US" dirty="0" err="1"/>
+              <a:t>acompanied</a:t>
+            </a:r>
+            <a:r>
+              <a:rPr lang="en-US" dirty="0"/>
+              <a:t> with Reference Materials</a:t>
+            </a:r>
+          </a:p>
+          <a:p>
+            <a:pPr marL="18900" indent="0">
+              <a:spcBef>
+                <a:spcPts val="1200"/>
+              </a:spcBef>
+              <a:spcAft>
+                <a:spcPts val="600"/>
+              </a:spcAft>
+              <a:buClr>
+                <a:srgbClr val="FFC000"/>
+              </a:buClr>
+              <a:buNone/>
+              <a:tabLst>
+                <a:tab pos="36000" algn="l"/>
+              </a:tabLst>
+            </a:pPr>
+            <a:r>
+              <a:rPr lang="en-US" dirty="0"/>
+              <a:t>Tutorials have </a:t>
+            </a:r>
+            <a:r>
+              <a:rPr lang="en-US" dirty="0" err="1"/>
+              <a:t>assesments</a:t>
+            </a:r>
+            <a:r>
+              <a:rPr lang="en-US" dirty="0"/>
+              <a:t> in </a:t>
+            </a:r>
+            <a:r>
+              <a:rPr lang="en-US" dirty="0" err="1"/>
+              <a:t>Googleclassroom</a:t>
+            </a:r>
+            <a:endParaRPr lang="en-US" dirty="0"/>
           </a:p>
         </p:txBody>
       </p:sp>
@@ -3314,7 +3379,14 @@
         <p:cNvGrpSpPr/>
         <p:nvPr/>
       </p:nvGrpSpPr>
-      <p:grpSpPr/>
+      <p:grpSpPr>
+        <a:xfrm>
+          <a:off x="0" y="0"/>
+          <a:ext cx="0" cy="0"/>
+          <a:chOff x="0" y="0"/>
+          <a:chExt cx="0" cy="0"/>
+        </a:xfrm>
+      </p:grpSpPr>
       <p:sp>
         <p:nvSpPr>
           <p:cNvPr id="2" name="Title 1"/>
@@ -3328,12 +3400,12 @@
         <p:spPr/>
         <p:txBody>
           <a:bodyPr/>
+          <a:lstStyle/>
           <a:p>
             <a:r>
               <a:rPr lang="en-US"/>
               <a:t>Levels - 1 Or Primary</a:t>
             </a:r>
-            <a:endParaRPr lang="en-US"/>
           </a:p>
         </p:txBody>
       </p:sp>
@@ -3341,14 +3413,14 @@
         <p:nvPicPr>
           <p:cNvPr id="4" name="Content Placeholder 3"/>
           <p:cNvPicPr>
-            <a:picLocks noChangeAspect="1"/>
+            <a:picLocks noGrp="1" noChangeAspect="1"/>
           </p:cNvPicPr>
           <p:nvPr>
             <p:ph sz="half" idx="1"/>
           </p:nvPr>
         </p:nvPicPr>
         <p:blipFill>
-          <a:blip r:embed="rId1"/>
+          <a:blip r:embed="rId2"/>
           <a:stretch>
             <a:fillRect/>
           </a:stretch>
@@ -3372,7 +3444,7 @@
           <p:nvPr/>
         </p:nvPicPr>
         <p:blipFill>
-          <a:blip r:embed="rId2"/>
+          <a:blip r:embed="rId3"/>
           <a:stretch>
             <a:fillRect/>
           </a:stretch>
@@ -3396,7 +3468,7 @@
           <p:nvPr/>
         </p:nvPicPr>
         <p:blipFill>
-          <a:blip r:embed="rId3"/>
+          <a:blip r:embed="rId4"/>
           <a:stretch>
             <a:fillRect/>
           </a:stretch>
@@ -3436,7 +3508,14 @@
         <p:cNvGrpSpPr/>
         <p:nvPr/>
       </p:nvGrpSpPr>
-      <p:grpSpPr/>
+      <p:grpSpPr>
+        <a:xfrm>
+          <a:off x="0" y="0"/>
+          <a:ext cx="0" cy="0"/>
+          <a:chOff x="0" y="0"/>
+          <a:chExt cx="0" cy="0"/>
+        </a:xfrm>
+      </p:grpSpPr>
       <p:sp>
         <p:nvSpPr>
           <p:cNvPr id="2" name="Title 1"/>
@@ -3450,12 +3529,12 @@
         <p:spPr/>
         <p:txBody>
           <a:bodyPr/>
+          <a:lstStyle/>
           <a:p>
             <a:r>
               <a:rPr lang="en-US"/>
               <a:t>Levels - 2 Or Intermediate (UI Skills)</a:t>
             </a:r>
-            <a:endParaRPr lang="en-US"/>
           </a:p>
         </p:txBody>
       </p:sp>
@@ -3496,6 +3575,7 @@
         </p:spPr>
         <p:txBody>
           <a:bodyPr vert="horz" wrap="none" lIns="91440" tIns="45720" rIns="91440" bIns="45720" numCol="1" anchor="ctr" anchorCtr="0" compatLnSpc="1"/>
+          <a:lstStyle/>
           <a:p>
             <a:pPr marL="0" marR="0" indent="0" algn="l" defTabSz="914400" rtl="0" eaLnBrk="1" fontAlgn="base" latinLnBrk="0" hangingPunct="1">
               <a:lnSpc>
@@ -3512,7 +3592,7 @@
               <a:buFontTx/>
               <a:buNone/>
             </a:pPr>
-            <a:endParaRPr kumimoji="0" lang="zh-CN" altLang="en-US" sz="1800" b="0" i="0" u="none" strike="noStrike" cap="none" normalizeH="0" baseline="0" smtClean="0">
+            <a:endParaRPr kumimoji="0" lang="zh-CN" altLang="en-US" sz="1800" b="0" i="0" u="none" strike="noStrike" cap="none" normalizeH="0" baseline="0">
               <a:ln>
                 <a:noFill/>
               </a:ln>
@@ -3563,6 +3643,7 @@
         </p:spPr>
         <p:txBody>
           <a:bodyPr vert="horz" wrap="none" lIns="91440" tIns="45720" rIns="91440" bIns="45720" numCol="1" anchor="ctr" anchorCtr="0" compatLnSpc="1"/>
+          <a:lstStyle/>
           <a:p>
             <a:pPr marL="0" marR="0" indent="0" algn="l" defTabSz="914400" rtl="0" eaLnBrk="1" fontAlgn="base" latinLnBrk="0" hangingPunct="1">
               <a:lnSpc>
@@ -3579,7 +3660,7 @@
               <a:buFontTx/>
               <a:buNone/>
             </a:pPr>
-            <a:endParaRPr kumimoji="0" lang="zh-CN" altLang="en-US" sz="1800" b="0" i="0" u="none" strike="noStrike" cap="none" normalizeH="0" baseline="0" smtClean="0">
+            <a:endParaRPr kumimoji="0" lang="zh-CN" altLang="en-US" sz="1800" b="0" i="0" u="none" strike="noStrike" cap="none" normalizeH="0" baseline="0">
               <a:ln>
                 <a:noFill/>
               </a:ln>
@@ -3630,6 +3711,7 @@
         </p:spPr>
         <p:txBody>
           <a:bodyPr vert="horz" wrap="none" lIns="91440" tIns="45720" rIns="91440" bIns="45720" numCol="1" anchor="ctr" anchorCtr="0" compatLnSpc="1"/>
+          <a:lstStyle/>
           <a:p>
             <a:pPr marL="0" marR="0" indent="0" algn="l" defTabSz="914400" rtl="0" eaLnBrk="1" fontAlgn="base" latinLnBrk="0" hangingPunct="1">
               <a:lnSpc>
@@ -3646,7 +3728,7 @@
               <a:buFontTx/>
               <a:buNone/>
             </a:pPr>
-            <a:endParaRPr kumimoji="0" lang="zh-CN" altLang="en-US" sz="1800" b="0" i="0" u="none" strike="noStrike" cap="none" normalizeH="0" baseline="0" smtClean="0">
+            <a:endParaRPr kumimoji="0" lang="zh-CN" altLang="en-US" sz="1800" b="0" i="0" u="none" strike="noStrike" cap="none" normalizeH="0" baseline="0">
               <a:ln>
                 <a:noFill/>
               </a:ln>
@@ -3669,7 +3751,7 @@
           <p:nvPr/>
         </p:nvPicPr>
         <p:blipFill>
-          <a:blip r:embed="rId1"/>
+          <a:blip r:embed="rId2"/>
           <a:stretch>
             <a:fillRect/>
           </a:stretch>
@@ -3688,14 +3770,14 @@
         <p:nvPicPr>
           <p:cNvPr id="11" name="Content Placeholder 10" descr="css3-logo-png-transparent"/>
           <p:cNvPicPr>
-            <a:picLocks noChangeAspect="1"/>
+            <a:picLocks noGrp="1" noChangeAspect="1"/>
           </p:cNvPicPr>
           <p:nvPr>
             <p:ph sz="half" idx="1"/>
           </p:nvPr>
         </p:nvPicPr>
         <p:blipFill>
-          <a:blip r:embed="rId2"/>
+          <a:blip r:embed="rId3"/>
           <a:stretch>
             <a:fillRect/>
           </a:stretch>
@@ -3714,14 +3796,14 @@
         <p:nvPicPr>
           <p:cNvPr id="12" name="Content Placeholder 11" descr="javascript-logo-png-transparent"/>
           <p:cNvPicPr>
-            <a:picLocks noChangeAspect="1"/>
+            <a:picLocks noGrp="1" noChangeAspect="1"/>
           </p:cNvPicPr>
           <p:nvPr>
             <p:ph sz="half" idx="2"/>
           </p:nvPr>
         </p:nvPicPr>
         <p:blipFill>
-          <a:blip r:embed="rId3"/>
+          <a:blip r:embed="rId4"/>
           <a:stretch>
             <a:fillRect/>
           </a:stretch>
@@ -3745,7 +3827,7 @@
           <p:nvPr/>
         </p:nvPicPr>
         <p:blipFill>
-          <a:blip r:embed="rId4"/>
+          <a:blip r:embed="rId5"/>
           <a:stretch>
             <a:fillRect/>
           </a:stretch>
@@ -3767,10 +3849,10 @@
           <p:nvPr/>
         </p:nvPicPr>
         <p:blipFill>
-          <a:blip r:embed="rId5">
+          <a:blip r:embed="rId6">
             <a:extLst>
               <a:ext uri="{96DAC541-7B7A-43D3-8B79-37D633B846F1}">
-                <asvg:svgBlip xmlns:asvg="http://schemas.microsoft.com/office/drawing/2016/SVG/main" r:embed="rId6"/>
+                <asvg:svgBlip xmlns:asvg="http://schemas.microsoft.com/office/drawing/2016/SVG/main" r:embed="rId7"/>
               </a:ext>
             </a:extLst>
           </a:blip>
@@ -3798,7 +3880,7 @@
           <p:nvPr/>
         </p:nvPicPr>
         <p:blipFill>
-          <a:blip r:embed="rId7"/>
+          <a:blip r:embed="rId8"/>
           <a:stretch>
             <a:fillRect/>
           </a:stretch>
@@ -3838,7 +3920,14 @@
         <p:cNvGrpSpPr/>
         <p:nvPr/>
       </p:nvGrpSpPr>
-      <p:grpSpPr/>
+      <p:grpSpPr>
+        <a:xfrm>
+          <a:off x="0" y="0"/>
+          <a:ext cx="0" cy="0"/>
+          <a:chOff x="0" y="0"/>
+          <a:chExt cx="0" cy="0"/>
+        </a:xfrm>
+      </p:grpSpPr>
       <p:sp>
         <p:nvSpPr>
           <p:cNvPr id="2" name="Title 1"/>
@@ -3852,12 +3941,12 @@
         <p:spPr/>
         <p:txBody>
           <a:bodyPr/>
+          <a:lstStyle/>
           <a:p>
             <a:r>
               <a:rPr lang="en-US"/>
               <a:t>Levels - 3 (Backend Skills)</a:t>
             </a:r>
-            <a:endParaRPr lang="en-US"/>
           </a:p>
         </p:txBody>
       </p:sp>
@@ -3865,14 +3954,14 @@
         <p:nvPicPr>
           <p:cNvPr id="10" name="Content Placeholder 9" descr="java-4-logo-png-transparent"/>
           <p:cNvPicPr>
-            <a:picLocks noChangeAspect="1"/>
+            <a:picLocks noGrp="1" noChangeAspect="1"/>
           </p:cNvPicPr>
           <p:nvPr>
             <p:ph sz="half" idx="1"/>
           </p:nvPr>
         </p:nvPicPr>
         <p:blipFill>
-          <a:blip r:embed="rId1"/>
+          <a:blip r:embed="rId2"/>
           <a:stretch>
             <a:fillRect/>
           </a:stretch>
@@ -3891,14 +3980,14 @@
         <p:nvPicPr>
           <p:cNvPr id="11" name="Content Placeholder 10" descr="spring-3-logo-png-transparent"/>
           <p:cNvPicPr>
-            <a:picLocks noChangeAspect="1"/>
+            <a:picLocks noGrp="1" noChangeAspect="1"/>
           </p:cNvPicPr>
           <p:nvPr>
             <p:ph sz="half" idx="2"/>
           </p:nvPr>
         </p:nvPicPr>
         <p:blipFill>
-          <a:blip r:embed="rId2"/>
+          <a:blip r:embed="rId3"/>
           <a:stretch>
             <a:fillRect/>
           </a:stretch>
@@ -3937,6 +4026,7 @@
               <a:lightRig rig="threePt" dir="t"/>
             </a:scene3d>
           </a:bodyPr>
+          <a:lstStyle/>
           <a:p>
             <a:pPr algn="ctr"/>
             <a:r>
@@ -3954,18 +4044,6 @@
               </a:rPr>
               <a:t>Springboot</a:t>
             </a:r>
-            <a:endParaRPr lang="en-US" sz="4800">
-              <a:solidFill>
-                <a:schemeClr val="accent1"/>
-              </a:solidFill>
-              <a:effectLst>
-                <a:outerShdw blurRad="38100" dist="25400" dir="5400000" algn="ctr" rotWithShape="0">
-                  <a:srgbClr val="6E747A">
-                    <a:alpha val="43000"/>
-                  </a:srgbClr>
-                </a:outerShdw>
-              </a:effectLst>
-            </a:endParaRPr>
           </a:p>
         </p:txBody>
       </p:sp>
@@ -3986,7 +4064,14 @@
         <p:cNvGrpSpPr/>
         <p:nvPr/>
       </p:nvGrpSpPr>
-      <p:grpSpPr/>
+      <p:grpSpPr>
+        <a:xfrm>
+          <a:off x="0" y="0"/>
+          <a:ext cx="0" cy="0"/>
+          <a:chOff x="0" y="0"/>
+          <a:chExt cx="0" cy="0"/>
+        </a:xfrm>
+      </p:grpSpPr>
       <p:sp>
         <p:nvSpPr>
           <p:cNvPr id="2" name="Title 1"/>
@@ -4005,6 +4090,7 @@
         </p:spPr>
         <p:txBody>
           <a:bodyPr/>
+          <a:lstStyle/>
           <a:p>
             <a:pPr algn="ctr"/>
             <a:r>
@@ -4022,18 +4108,6 @@
               </a:rPr>
               <a:t>Join Me In This Learning Journey</a:t>
             </a:r>
-            <a:endParaRPr lang="en-US" sz="4800">
-              <a:solidFill>
-                <a:schemeClr val="accent1"/>
-              </a:solidFill>
-              <a:effectLst>
-                <a:outerShdw blurRad="38100" dist="25400" dir="5400000" algn="ctr" rotWithShape="0">
-                  <a:srgbClr val="6E747A">
-                    <a:alpha val="43000"/>
-                  </a:srgbClr>
-                </a:outerShdw>
-              </a:effectLst>
-            </a:endParaRPr>
           </a:p>
         </p:txBody>
       </p:sp>
@@ -4236,6 +4310,7 @@
       </a:bgFillStyleLst>
     </a:fmtScheme>
   </a:themeElements>
+  <a:objectDefaults/>
   <a:extraClrSchemeLst>
     <a:extraClrScheme>
       <a:clrScheme name="">

</xml_diff>